<commit_message>
[coffee] Finalizing a presentation file
</commit_message>
<xml_diff>
--- a/coffeescript/coffeescript.pptx
+++ b/coffeescript/coffeescript.pptx
@@ -5,13 +5,21 @@
     <p:sldMasterId id="2147483648" r:id="rId1"/>
   </p:sldMasterIdLst>
   <p:notesMasterIdLst>
-    <p:notesMasterId r:id="rId6"/>
+    <p:notesMasterId r:id="rId14"/>
   </p:notesMasterIdLst>
   <p:sldIdLst>
     <p:sldId id="256" r:id="rId2"/>
     <p:sldId id="257" r:id="rId3"/>
     <p:sldId id="258" r:id="rId4"/>
     <p:sldId id="259" r:id="rId5"/>
+    <p:sldId id="260" r:id="rId6"/>
+    <p:sldId id="261" r:id="rId7"/>
+    <p:sldId id="262" r:id="rId8"/>
+    <p:sldId id="263" r:id="rId9"/>
+    <p:sldId id="264" r:id="rId10"/>
+    <p:sldId id="265" r:id="rId11"/>
+    <p:sldId id="266" r:id="rId12"/>
+    <p:sldId id="267" r:id="rId13"/>
   </p:sldIdLst>
   <p:sldSz cx="12192000" cy="6858000"/>
   <p:notesSz cx="6858000" cy="9144000"/>
@@ -748,6 +756,21 @@
               <a:rPr lang="en-US" baseline="0" dirty="0" err="1" smtClean="0"/>
               <a:t>javascript</a:t>
             </a:r>
+            <a:endParaRPr lang="en-US" baseline="0" dirty="0" smtClean="0"/>
+          </a:p>
+          <a:p>
+            <a:pPr marL="171450" indent="-171450">
+              <a:buFontTx/>
+              <a:buChar char="-"/>
+            </a:pPr>
+            <a:r>
+              <a:rPr lang="en-CA" dirty="0" smtClean="0"/>
+              <a:t>Coffee does not deprecate your old JS code. It works</a:t>
+            </a:r>
+            <a:r>
+              <a:rPr lang="en-CA" baseline="0" dirty="0" smtClean="0"/>
+              <a:t> with every JS version</a:t>
+            </a:r>
             <a:endParaRPr lang="en-US" dirty="0"/>
           </a:p>
         </p:txBody>
@@ -836,11 +859,89 @@
               <a:buFontTx/>
               <a:buChar char="-"/>
             </a:pPr>
-            <a:r>
-              <a:rPr lang="en-US" baseline="0" dirty="0" smtClean="0"/>
-              <a:t>Programs in coffee are much more simpler that in JS</a:t>
-            </a:r>
-          </a:p>
+            <a:endParaRPr lang="en-US" dirty="0"/>
+          </a:p>
+        </p:txBody>
+      </p:sp>
+      <p:sp>
+        <p:nvSpPr>
+          <p:cNvPr id="4" name="Slide Number Placeholder 3"/>
+          <p:cNvSpPr>
+            <a:spLocks noGrp="1"/>
+          </p:cNvSpPr>
+          <p:nvPr>
+            <p:ph type="sldNum" sz="quarter" idx="10"/>
+          </p:nvPr>
+        </p:nvSpPr>
+        <p:spPr/>
+        <p:txBody>
+          <a:bodyPr/>
+          <a:lstStyle/>
+          <a:p>
+            <a:fld id="{1248D640-4A2F-4A8C-8E2D-3C6025A34183}" type="slidenum">
+              <a:rPr lang="en-US" smtClean="0"/>
+              <a:t>4</a:t>
+            </a:fld>
+            <a:endParaRPr lang="en-US"/>
+          </a:p>
+        </p:txBody>
+      </p:sp>
+    </p:spTree>
+    <p:extLst>
+      <p:ext uri="{BB962C8B-B14F-4D97-AF65-F5344CB8AC3E}">
+        <p14:creationId xmlns:p14="http://schemas.microsoft.com/office/powerpoint/2010/main" val="3862004539"/>
+      </p:ext>
+    </p:extLst>
+  </p:cSld>
+  <p:clrMapOvr>
+    <a:masterClrMapping/>
+  </p:clrMapOvr>
+</p:notes>
+</file>
+
+<file path=ppt/notesSlides/notesSlide4.xml><?xml version="1.0" encoding="utf-8"?>
+<p:notes xmlns:a="http://schemas.openxmlformats.org/drawingml/2006/main" xmlns:r="http://schemas.openxmlformats.org/officeDocument/2006/relationships" xmlns:p="http://schemas.openxmlformats.org/presentationml/2006/main">
+  <p:cSld>
+    <p:spTree>
+      <p:nvGrpSpPr>
+        <p:cNvPr id="1" name=""/>
+        <p:cNvGrpSpPr/>
+        <p:nvPr/>
+      </p:nvGrpSpPr>
+      <p:grpSpPr>
+        <a:xfrm>
+          <a:off x="0" y="0"/>
+          <a:ext cx="0" cy="0"/>
+          <a:chOff x="0" y="0"/>
+          <a:chExt cx="0" cy="0"/>
+        </a:xfrm>
+      </p:grpSpPr>
+      <p:sp>
+        <p:nvSpPr>
+          <p:cNvPr id="2" name="Slide Image Placeholder 1"/>
+          <p:cNvSpPr>
+            <a:spLocks noGrp="1" noRot="1" noChangeAspect="1"/>
+          </p:cNvSpPr>
+          <p:nvPr>
+            <p:ph type="sldImg"/>
+          </p:nvPr>
+        </p:nvSpPr>
+        <p:spPr/>
+      </p:sp>
+      <p:sp>
+        <p:nvSpPr>
+          <p:cNvPr id="3" name="Notes Placeholder 2"/>
+          <p:cNvSpPr>
+            <a:spLocks noGrp="1"/>
+          </p:cNvSpPr>
+          <p:nvPr>
+            <p:ph type="body" idx="1"/>
+          </p:nvPr>
+        </p:nvSpPr>
+        <p:spPr/>
+        <p:txBody>
+          <a:bodyPr/>
+          <a:lstStyle/>
           <a:p>
             <a:pPr marL="171450" indent="-171450">
               <a:buFontTx/>
@@ -848,48 +949,188 @@
             </a:pPr>
             <a:r>
               <a:rPr lang="en-US" dirty="0" smtClean="0"/>
-              <a:t>For</a:t>
-            </a:r>
-            <a:r>
-              <a:rPr lang="en-US" baseline="0" dirty="0" smtClean="0"/>
-              <a:t> the same functionalities coffee code can be 3 times more compact that an equivalent on JS</a:t>
-            </a:r>
-          </a:p>
+              <a:t>Brendan saved us form </a:t>
+            </a:r>
+            <a:r>
+              <a:rPr lang="en-US" dirty="0" err="1" smtClean="0"/>
+              <a:t>vbscript</a:t>
+            </a:r>
+            <a:endParaRPr lang="en-US" dirty="0"/>
+          </a:p>
+        </p:txBody>
+      </p:sp>
+      <p:sp>
+        <p:nvSpPr>
+          <p:cNvPr id="4" name="Slide Number Placeholder 3"/>
+          <p:cNvSpPr>
+            <a:spLocks noGrp="1"/>
+          </p:cNvSpPr>
+          <p:nvPr>
+            <p:ph type="sldNum" sz="quarter" idx="10"/>
+          </p:nvPr>
+        </p:nvSpPr>
+        <p:spPr/>
+        <p:txBody>
+          <a:bodyPr/>
+          <a:lstStyle/>
+          <a:p>
+            <a:fld id="{1248D640-4A2F-4A8C-8E2D-3C6025A34183}" type="slidenum">
+              <a:rPr lang="en-US" smtClean="0"/>
+              <a:t>5</a:t>
+            </a:fld>
+            <a:endParaRPr lang="en-US"/>
+          </a:p>
+        </p:txBody>
+      </p:sp>
+    </p:spTree>
+    <p:extLst>
+      <p:ext uri="{BB962C8B-B14F-4D97-AF65-F5344CB8AC3E}">
+        <p14:creationId xmlns:p14="http://schemas.microsoft.com/office/powerpoint/2010/main" val="1526428441"/>
+      </p:ext>
+    </p:extLst>
+  </p:cSld>
+  <p:clrMapOvr>
+    <a:masterClrMapping/>
+  </p:clrMapOvr>
+</p:notes>
+</file>
+
+<file path=ppt/notesSlides/notesSlide5.xml><?xml version="1.0" encoding="utf-8"?>
+<p:notes xmlns:a="http://schemas.openxmlformats.org/drawingml/2006/main" xmlns:r="http://schemas.openxmlformats.org/officeDocument/2006/relationships" xmlns:p="http://schemas.openxmlformats.org/presentationml/2006/main">
+  <p:cSld>
+    <p:spTree>
+      <p:nvGrpSpPr>
+        <p:cNvPr id="1" name=""/>
+        <p:cNvGrpSpPr/>
+        <p:nvPr/>
+      </p:nvGrpSpPr>
+      <p:grpSpPr>
+        <a:xfrm>
+          <a:off x="0" y="0"/>
+          <a:ext cx="0" cy="0"/>
+          <a:chOff x="0" y="0"/>
+          <a:chExt cx="0" cy="0"/>
+        </a:xfrm>
+      </p:grpSpPr>
+      <p:sp>
+        <p:nvSpPr>
+          <p:cNvPr id="2" name="Slide Image Placeholder 1"/>
+          <p:cNvSpPr>
+            <a:spLocks noGrp="1" noRot="1" noChangeAspect="1"/>
+          </p:cNvSpPr>
+          <p:nvPr>
+            <p:ph type="sldImg"/>
+          </p:nvPr>
+        </p:nvSpPr>
+        <p:spPr/>
+      </p:sp>
+      <p:sp>
+        <p:nvSpPr>
+          <p:cNvPr id="3" name="Notes Placeholder 2"/>
+          <p:cNvSpPr>
+            <a:spLocks noGrp="1"/>
+          </p:cNvSpPr>
+          <p:nvPr>
+            <p:ph type="body" idx="1"/>
+          </p:nvPr>
+        </p:nvSpPr>
+        <p:spPr/>
+        <p:txBody>
+          <a:bodyPr/>
+          <a:lstStyle/>
           <a:p>
             <a:pPr marL="171450" indent="-171450">
               <a:buFontTx/>
               <a:buChar char="-"/>
             </a:pPr>
-            <a:r>
-              <a:rPr lang="en-US" baseline="0" dirty="0" smtClean="0"/>
-              <a:t>All coffee programs are as rapid as classic </a:t>
-            </a:r>
-            <a:r>
-              <a:rPr lang="en-US" baseline="0" dirty="0" err="1" smtClean="0"/>
-              <a:t>js</a:t>
-            </a:r>
-            <a:r>
-              <a:rPr lang="en-US" baseline="0" dirty="0" smtClean="0"/>
-              <a:t> programs</a:t>
-            </a:r>
-          </a:p>
+            <a:endParaRPr lang="en-US" dirty="0"/>
+          </a:p>
+        </p:txBody>
+      </p:sp>
+      <p:sp>
+        <p:nvSpPr>
+          <p:cNvPr id="4" name="Slide Number Placeholder 3"/>
+          <p:cNvSpPr>
+            <a:spLocks noGrp="1"/>
+          </p:cNvSpPr>
+          <p:nvPr>
+            <p:ph type="sldNum" sz="quarter" idx="10"/>
+          </p:nvPr>
+        </p:nvSpPr>
+        <p:spPr/>
+        <p:txBody>
+          <a:bodyPr/>
+          <a:lstStyle/>
+          <a:p>
+            <a:fld id="{1248D640-4A2F-4A8C-8E2D-3C6025A34183}" type="slidenum">
+              <a:rPr lang="en-US" smtClean="0"/>
+              <a:t>6</a:t>
+            </a:fld>
+            <a:endParaRPr lang="en-US"/>
+          </a:p>
+        </p:txBody>
+      </p:sp>
+    </p:spTree>
+    <p:extLst>
+      <p:ext uri="{BB962C8B-B14F-4D97-AF65-F5344CB8AC3E}">
+        <p14:creationId xmlns:p14="http://schemas.microsoft.com/office/powerpoint/2010/main" val="2831815247"/>
+      </p:ext>
+    </p:extLst>
+  </p:cSld>
+  <p:clrMapOvr>
+    <a:masterClrMapping/>
+  </p:clrMapOvr>
+</p:notes>
+</file>
+
+<file path=ppt/notesSlides/notesSlide6.xml><?xml version="1.0" encoding="utf-8"?>
+<p:notes xmlns:a="http://schemas.openxmlformats.org/drawingml/2006/main" xmlns:r="http://schemas.openxmlformats.org/officeDocument/2006/relationships" xmlns:p="http://schemas.openxmlformats.org/presentationml/2006/main">
+  <p:cSld>
+    <p:spTree>
+      <p:nvGrpSpPr>
+        <p:cNvPr id="1" name=""/>
+        <p:cNvGrpSpPr/>
+        <p:nvPr/>
+      </p:nvGrpSpPr>
+      <p:grpSpPr>
+        <a:xfrm>
+          <a:off x="0" y="0"/>
+          <a:ext cx="0" cy="0"/>
+          <a:chOff x="0" y="0"/>
+          <a:chExt cx="0" cy="0"/>
+        </a:xfrm>
+      </p:grpSpPr>
+      <p:sp>
+        <p:nvSpPr>
+          <p:cNvPr id="2" name="Slide Image Placeholder 1"/>
+          <p:cNvSpPr>
+            <a:spLocks noGrp="1" noRot="1" noChangeAspect="1"/>
+          </p:cNvSpPr>
+          <p:nvPr>
+            <p:ph type="sldImg"/>
+          </p:nvPr>
+        </p:nvSpPr>
+        <p:spPr/>
+      </p:sp>
+      <p:sp>
+        <p:nvSpPr>
+          <p:cNvPr id="3" name="Notes Placeholder 2"/>
+          <p:cNvSpPr>
+            <a:spLocks noGrp="1"/>
+          </p:cNvSpPr>
+          <p:nvPr>
+            <p:ph type="body" idx="1"/>
+          </p:nvPr>
+        </p:nvSpPr>
+        <p:spPr/>
+        <p:txBody>
+          <a:bodyPr/>
+          <a:lstStyle/>
           <a:p>
             <a:pPr marL="171450" indent="-171450">
               <a:buFontTx/>
               <a:buChar char="-"/>
             </a:pPr>
-            <a:r>
-              <a:rPr lang="en-US" dirty="0" smtClean="0"/>
-              <a:t>Coffee hide or smooth over some</a:t>
-            </a:r>
-            <a:r>
-              <a:rPr lang="en-US" baseline="0" dirty="0" smtClean="0"/>
-              <a:t> of sharp corner of </a:t>
-            </a:r>
-            <a:r>
-              <a:rPr lang="en-US" baseline="0" smtClean="0"/>
-              <a:t>javascript</a:t>
-            </a:r>
             <a:endParaRPr lang="en-US" dirty="0"/>
           </a:p>
         </p:txBody>
@@ -911,7 +1152,7 @@
           <a:p>
             <a:fld id="{1248D640-4A2F-4A8C-8E2D-3C6025A34183}" type="slidenum">
               <a:rPr lang="en-US" smtClean="0"/>
-              <a:t>4</a:t>
+              <a:t>7</a:t>
             </a:fld>
             <a:endParaRPr lang="en-US"/>
           </a:p>
@@ -920,7 +1161,183 @@
     </p:spTree>
     <p:extLst>
       <p:ext uri="{BB962C8B-B14F-4D97-AF65-F5344CB8AC3E}">
-        <p14:creationId xmlns:p14="http://schemas.microsoft.com/office/powerpoint/2010/main" val="3862004539"/>
+        <p14:creationId xmlns:p14="http://schemas.microsoft.com/office/powerpoint/2010/main" val="2167955836"/>
+      </p:ext>
+    </p:extLst>
+  </p:cSld>
+  <p:clrMapOvr>
+    <a:masterClrMapping/>
+  </p:clrMapOvr>
+</p:notes>
+</file>
+
+<file path=ppt/notesSlides/notesSlide7.xml><?xml version="1.0" encoding="utf-8"?>
+<p:notes xmlns:a="http://schemas.openxmlformats.org/drawingml/2006/main" xmlns:r="http://schemas.openxmlformats.org/officeDocument/2006/relationships" xmlns:p="http://schemas.openxmlformats.org/presentationml/2006/main">
+  <p:cSld>
+    <p:spTree>
+      <p:nvGrpSpPr>
+        <p:cNvPr id="1" name=""/>
+        <p:cNvGrpSpPr/>
+        <p:nvPr/>
+      </p:nvGrpSpPr>
+      <p:grpSpPr>
+        <a:xfrm>
+          <a:off x="0" y="0"/>
+          <a:ext cx="0" cy="0"/>
+          <a:chOff x="0" y="0"/>
+          <a:chExt cx="0" cy="0"/>
+        </a:xfrm>
+      </p:grpSpPr>
+      <p:sp>
+        <p:nvSpPr>
+          <p:cNvPr id="2" name="Slide Image Placeholder 1"/>
+          <p:cNvSpPr>
+            <a:spLocks noGrp="1" noRot="1" noChangeAspect="1"/>
+          </p:cNvSpPr>
+          <p:nvPr>
+            <p:ph type="sldImg"/>
+          </p:nvPr>
+        </p:nvSpPr>
+        <p:spPr/>
+      </p:sp>
+      <p:sp>
+        <p:nvSpPr>
+          <p:cNvPr id="3" name="Notes Placeholder 2"/>
+          <p:cNvSpPr>
+            <a:spLocks noGrp="1"/>
+          </p:cNvSpPr>
+          <p:nvPr>
+            <p:ph type="body" idx="1"/>
+          </p:nvPr>
+        </p:nvSpPr>
+        <p:spPr/>
+        <p:txBody>
+          <a:bodyPr/>
+          <a:lstStyle/>
+          <a:p>
+            <a:pPr marL="171450" indent="-171450">
+              <a:buFontTx/>
+              <a:buChar char="-"/>
+            </a:pPr>
+            <a:endParaRPr lang="en-US" dirty="0"/>
+          </a:p>
+        </p:txBody>
+      </p:sp>
+      <p:sp>
+        <p:nvSpPr>
+          <p:cNvPr id="4" name="Slide Number Placeholder 3"/>
+          <p:cNvSpPr>
+            <a:spLocks noGrp="1"/>
+          </p:cNvSpPr>
+          <p:nvPr>
+            <p:ph type="sldNum" sz="quarter" idx="10"/>
+          </p:nvPr>
+        </p:nvSpPr>
+        <p:spPr/>
+        <p:txBody>
+          <a:bodyPr/>
+          <a:lstStyle/>
+          <a:p>
+            <a:fld id="{1248D640-4A2F-4A8C-8E2D-3C6025A34183}" type="slidenum">
+              <a:rPr lang="en-US" smtClean="0"/>
+              <a:t>10</a:t>
+            </a:fld>
+            <a:endParaRPr lang="en-US"/>
+          </a:p>
+        </p:txBody>
+      </p:sp>
+    </p:spTree>
+    <p:extLst>
+      <p:ext uri="{BB962C8B-B14F-4D97-AF65-F5344CB8AC3E}">
+        <p14:creationId xmlns:p14="http://schemas.microsoft.com/office/powerpoint/2010/main" val="57330581"/>
+      </p:ext>
+    </p:extLst>
+  </p:cSld>
+  <p:clrMapOvr>
+    <a:masterClrMapping/>
+  </p:clrMapOvr>
+</p:notes>
+</file>
+
+<file path=ppt/notesSlides/notesSlide8.xml><?xml version="1.0" encoding="utf-8"?>
+<p:notes xmlns:a="http://schemas.openxmlformats.org/drawingml/2006/main" xmlns:r="http://schemas.openxmlformats.org/officeDocument/2006/relationships" xmlns:p="http://schemas.openxmlformats.org/presentationml/2006/main">
+  <p:cSld>
+    <p:spTree>
+      <p:nvGrpSpPr>
+        <p:cNvPr id="1" name=""/>
+        <p:cNvGrpSpPr/>
+        <p:nvPr/>
+      </p:nvGrpSpPr>
+      <p:grpSpPr>
+        <a:xfrm>
+          <a:off x="0" y="0"/>
+          <a:ext cx="0" cy="0"/>
+          <a:chOff x="0" y="0"/>
+          <a:chExt cx="0" cy="0"/>
+        </a:xfrm>
+      </p:grpSpPr>
+      <p:sp>
+        <p:nvSpPr>
+          <p:cNvPr id="2" name="Slide Image Placeholder 1"/>
+          <p:cNvSpPr>
+            <a:spLocks noGrp="1" noRot="1" noChangeAspect="1"/>
+          </p:cNvSpPr>
+          <p:nvPr>
+            <p:ph type="sldImg"/>
+          </p:nvPr>
+        </p:nvSpPr>
+        <p:spPr/>
+      </p:sp>
+      <p:sp>
+        <p:nvSpPr>
+          <p:cNvPr id="3" name="Notes Placeholder 2"/>
+          <p:cNvSpPr>
+            <a:spLocks noGrp="1"/>
+          </p:cNvSpPr>
+          <p:nvPr>
+            <p:ph type="body" idx="1"/>
+          </p:nvPr>
+        </p:nvSpPr>
+        <p:spPr/>
+        <p:txBody>
+          <a:bodyPr/>
+          <a:lstStyle/>
+          <a:p>
+            <a:pPr marL="171450" indent="-171450">
+              <a:buFontTx/>
+              <a:buChar char="-"/>
+            </a:pPr>
+            <a:endParaRPr lang="en-US" dirty="0"/>
+          </a:p>
+        </p:txBody>
+      </p:sp>
+      <p:sp>
+        <p:nvSpPr>
+          <p:cNvPr id="4" name="Slide Number Placeholder 3"/>
+          <p:cNvSpPr>
+            <a:spLocks noGrp="1"/>
+          </p:cNvSpPr>
+          <p:nvPr>
+            <p:ph type="sldNum" sz="quarter" idx="10"/>
+          </p:nvPr>
+        </p:nvSpPr>
+        <p:spPr/>
+        <p:txBody>
+          <a:bodyPr/>
+          <a:lstStyle/>
+          <a:p>
+            <a:fld id="{1248D640-4A2F-4A8C-8E2D-3C6025A34183}" type="slidenum">
+              <a:rPr lang="en-US" smtClean="0"/>
+              <a:t>11</a:t>
+            </a:fld>
+            <a:endParaRPr lang="en-US"/>
+          </a:p>
+        </p:txBody>
+      </p:sp>
+    </p:spTree>
+    <p:extLst>
+      <p:ext uri="{BB962C8B-B14F-4D97-AF65-F5344CB8AC3E}">
+        <p14:creationId xmlns:p14="http://schemas.microsoft.com/office/powerpoint/2010/main" val="481549292"/>
       </p:ext>
     </p:extLst>
   </p:cSld>
@@ -3846,6 +4263,818 @@
 </p:sld>
 </file>
 
+<file path=ppt/slides/slide10.xml><?xml version="1.0" encoding="utf-8"?>
+<p:sld xmlns:a="http://schemas.openxmlformats.org/drawingml/2006/main" xmlns:r="http://schemas.openxmlformats.org/officeDocument/2006/relationships" xmlns:p="http://schemas.openxmlformats.org/presentationml/2006/main">
+  <p:cSld>
+    <p:spTree>
+      <p:nvGrpSpPr>
+        <p:cNvPr id="1" name=""/>
+        <p:cNvGrpSpPr/>
+        <p:nvPr/>
+      </p:nvGrpSpPr>
+      <p:grpSpPr>
+        <a:xfrm>
+          <a:off x="0" y="0"/>
+          <a:ext cx="0" cy="0"/>
+          <a:chOff x="0" y="0"/>
+          <a:chExt cx="0" cy="0"/>
+        </a:xfrm>
+      </p:grpSpPr>
+      <p:sp>
+        <p:nvSpPr>
+          <p:cNvPr id="2" name="Title 1"/>
+          <p:cNvSpPr>
+            <a:spLocks noGrp="1"/>
+          </p:cNvSpPr>
+          <p:nvPr>
+            <p:ph type="title"/>
+          </p:nvPr>
+        </p:nvSpPr>
+        <p:spPr>
+          <a:xfrm>
+            <a:off x="838200" y="365126"/>
+            <a:ext cx="10515600" cy="714738"/>
+          </a:xfrm>
+        </p:spPr>
+        <p:txBody>
+          <a:bodyPr/>
+          <a:lstStyle/>
+          <a:p>
+            <a:r>
+              <a:rPr lang="en-US" dirty="0" smtClean="0"/>
+              <a:t>Douglas </a:t>
+            </a:r>
+            <a:r>
+              <a:rPr lang="en-US" dirty="0" err="1" smtClean="0"/>
+              <a:t>Crockford</a:t>
+            </a:r>
+            <a:endParaRPr lang="en-US" dirty="0"/>
+          </a:p>
+        </p:txBody>
+      </p:sp>
+      <p:sp>
+        <p:nvSpPr>
+          <p:cNvPr id="3" name="Content Placeholder 2"/>
+          <p:cNvSpPr>
+            <a:spLocks noGrp="1"/>
+          </p:cNvSpPr>
+          <p:nvPr>
+            <p:ph idx="1"/>
+          </p:nvPr>
+        </p:nvSpPr>
+        <p:spPr>
+          <a:xfrm>
+            <a:off x="496389" y="1227909"/>
+            <a:ext cx="5538651" cy="4949054"/>
+          </a:xfrm>
+        </p:spPr>
+        <p:txBody>
+          <a:bodyPr>
+            <a:normAutofit fontScale="77500" lnSpcReduction="20000"/>
+          </a:bodyPr>
+          <a:lstStyle/>
+          <a:p>
+            <a:pPr marL="0" indent="0">
+              <a:buNone/>
+            </a:pPr>
+            <a:r>
+              <a:rPr lang="en-CA" sz="3400" dirty="0" err="1" smtClean="0"/>
+              <a:t>CoffeeScript</a:t>
+            </a:r>
+            <a:endParaRPr lang="en-CA" sz="3400" dirty="0"/>
+          </a:p>
+          <a:p>
+            <a:pPr marL="0" indent="0">
+              <a:buNone/>
+            </a:pPr>
+            <a:r>
+              <a:rPr lang="en-CA" dirty="0" smtClean="0"/>
+              <a:t>One of my favorites along those lines is a new little language called </a:t>
+            </a:r>
+            <a:r>
+              <a:rPr lang="en-CA" dirty="0" err="1" smtClean="0"/>
+              <a:t>CoffeeScript</a:t>
+            </a:r>
+            <a:r>
+              <a:rPr lang="en-CA" dirty="0" smtClean="0"/>
+              <a:t>, which takes the good parts -- not even all of the good parts, but a nice little language -- and comes up with groovy new syntax for it, which is minimal. </a:t>
+            </a:r>
+          </a:p>
+          <a:p>
+            <a:pPr marL="0" indent="0">
+              <a:buNone/>
+            </a:pPr>
+            <a:r>
+              <a:rPr lang="en-CA" dirty="0" smtClean="0"/>
+              <a:t>It's almost like dandelions: little fluffs of programs that do everything that conventional JavaScript programs do. You can't do anything in that language that you can't do in JavaScript, so it's all cosmetic. I don't know if all or much of that will find its way into JavaScript, because I'm not sure there's enough of a payoff there. But just as an experiment, as a design exercise, I think it's a brilliant piece of work. I'm excited to see stuff like that happening.</a:t>
+            </a:r>
+            <a:endParaRPr lang="en-US" dirty="0" smtClean="0"/>
+          </a:p>
+        </p:txBody>
+      </p:sp>
+      <p:sp>
+        <p:nvSpPr>
+          <p:cNvPr id="4" name="Content Placeholder 2"/>
+          <p:cNvSpPr txBox="1">
+            <a:spLocks/>
+          </p:cNvSpPr>
+          <p:nvPr/>
+        </p:nvSpPr>
+        <p:spPr>
+          <a:xfrm>
+            <a:off x="6035040" y="1227909"/>
+            <a:ext cx="5860869" cy="4949054"/>
+          </a:xfrm>
+          <a:prstGeom prst="rect">
+            <a:avLst/>
+          </a:prstGeom>
+        </p:spPr>
+        <p:txBody>
+          <a:bodyPr vert="horz" lIns="91440" tIns="45720" rIns="91440" bIns="45720" rtlCol="0">
+            <a:normAutofit/>
+          </a:bodyPr>
+          <a:lstStyle>
+            <a:lvl1pPr marL="228600" indent="-228600" algn="l" defTabSz="914400" rtl="0" eaLnBrk="1" latinLnBrk="0" hangingPunct="1">
+              <a:lnSpc>
+                <a:spcPct val="90000"/>
+              </a:lnSpc>
+              <a:spcBef>
+                <a:spcPts val="1000"/>
+              </a:spcBef>
+              <a:buFont typeface="Arial" panose="020B0604020202020204" pitchFamily="34" charset="0"/>
+              <a:buChar char="•"/>
+              <a:defRPr sz="2800" kern="1200">
+                <a:solidFill>
+                  <a:schemeClr val="tx1"/>
+                </a:solidFill>
+                <a:latin typeface="+mn-lt"/>
+                <a:ea typeface="+mn-ea"/>
+                <a:cs typeface="+mn-cs"/>
+              </a:defRPr>
+            </a:lvl1pPr>
+            <a:lvl2pPr marL="685800" indent="-228600" algn="l" defTabSz="914400" rtl="0" eaLnBrk="1" latinLnBrk="0" hangingPunct="1">
+              <a:lnSpc>
+                <a:spcPct val="90000"/>
+              </a:lnSpc>
+              <a:spcBef>
+                <a:spcPts val="500"/>
+              </a:spcBef>
+              <a:buFont typeface="Arial" panose="020B0604020202020204" pitchFamily="34" charset="0"/>
+              <a:buChar char="•"/>
+              <a:defRPr sz="2400" kern="1200">
+                <a:solidFill>
+                  <a:schemeClr val="tx1"/>
+                </a:solidFill>
+                <a:latin typeface="+mn-lt"/>
+                <a:ea typeface="+mn-ea"/>
+                <a:cs typeface="+mn-cs"/>
+              </a:defRPr>
+            </a:lvl2pPr>
+            <a:lvl3pPr marL="1143000" indent="-228600" algn="l" defTabSz="914400" rtl="0" eaLnBrk="1" latinLnBrk="0" hangingPunct="1">
+              <a:lnSpc>
+                <a:spcPct val="90000"/>
+              </a:lnSpc>
+              <a:spcBef>
+                <a:spcPts val="500"/>
+              </a:spcBef>
+              <a:buFont typeface="Arial" panose="020B0604020202020204" pitchFamily="34" charset="0"/>
+              <a:buChar char="•"/>
+              <a:defRPr sz="2000" kern="1200">
+                <a:solidFill>
+                  <a:schemeClr val="tx1"/>
+                </a:solidFill>
+                <a:latin typeface="+mn-lt"/>
+                <a:ea typeface="+mn-ea"/>
+                <a:cs typeface="+mn-cs"/>
+              </a:defRPr>
+            </a:lvl3pPr>
+            <a:lvl4pPr marL="1600200" indent="-228600" algn="l" defTabSz="914400" rtl="0" eaLnBrk="1" latinLnBrk="0" hangingPunct="1">
+              <a:lnSpc>
+                <a:spcPct val="90000"/>
+              </a:lnSpc>
+              <a:spcBef>
+                <a:spcPts val="500"/>
+              </a:spcBef>
+              <a:buFont typeface="Arial" panose="020B0604020202020204" pitchFamily="34" charset="0"/>
+              <a:buChar char="•"/>
+              <a:defRPr sz="1800" kern="1200">
+                <a:solidFill>
+                  <a:schemeClr val="tx1"/>
+                </a:solidFill>
+                <a:latin typeface="+mn-lt"/>
+                <a:ea typeface="+mn-ea"/>
+                <a:cs typeface="+mn-cs"/>
+              </a:defRPr>
+            </a:lvl4pPr>
+            <a:lvl5pPr marL="2057400" indent="-228600" algn="l" defTabSz="914400" rtl="0" eaLnBrk="1" latinLnBrk="0" hangingPunct="1">
+              <a:lnSpc>
+                <a:spcPct val="90000"/>
+              </a:lnSpc>
+              <a:spcBef>
+                <a:spcPts val="500"/>
+              </a:spcBef>
+              <a:buFont typeface="Arial" panose="020B0604020202020204" pitchFamily="34" charset="0"/>
+              <a:buChar char="•"/>
+              <a:defRPr sz="1800" kern="1200">
+                <a:solidFill>
+                  <a:schemeClr val="tx1"/>
+                </a:solidFill>
+                <a:latin typeface="+mn-lt"/>
+                <a:ea typeface="+mn-ea"/>
+                <a:cs typeface="+mn-cs"/>
+              </a:defRPr>
+            </a:lvl5pPr>
+            <a:lvl6pPr marL="2514600" indent="-228600" algn="l" defTabSz="914400" rtl="0" eaLnBrk="1" latinLnBrk="0" hangingPunct="1">
+              <a:lnSpc>
+                <a:spcPct val="90000"/>
+              </a:lnSpc>
+              <a:spcBef>
+                <a:spcPts val="500"/>
+              </a:spcBef>
+              <a:buFont typeface="Arial" panose="020B0604020202020204" pitchFamily="34" charset="0"/>
+              <a:buChar char="•"/>
+              <a:defRPr sz="1800" kern="1200">
+                <a:solidFill>
+                  <a:schemeClr val="tx1"/>
+                </a:solidFill>
+                <a:latin typeface="+mn-lt"/>
+                <a:ea typeface="+mn-ea"/>
+                <a:cs typeface="+mn-cs"/>
+              </a:defRPr>
+            </a:lvl6pPr>
+            <a:lvl7pPr marL="2971800" indent="-228600" algn="l" defTabSz="914400" rtl="0" eaLnBrk="1" latinLnBrk="0" hangingPunct="1">
+              <a:lnSpc>
+                <a:spcPct val="90000"/>
+              </a:lnSpc>
+              <a:spcBef>
+                <a:spcPts val="500"/>
+              </a:spcBef>
+              <a:buFont typeface="Arial" panose="020B0604020202020204" pitchFamily="34" charset="0"/>
+              <a:buChar char="•"/>
+              <a:defRPr sz="1800" kern="1200">
+                <a:solidFill>
+                  <a:schemeClr val="tx1"/>
+                </a:solidFill>
+                <a:latin typeface="+mn-lt"/>
+                <a:ea typeface="+mn-ea"/>
+                <a:cs typeface="+mn-cs"/>
+              </a:defRPr>
+            </a:lvl7pPr>
+            <a:lvl8pPr marL="3429000" indent="-228600" algn="l" defTabSz="914400" rtl="0" eaLnBrk="1" latinLnBrk="0" hangingPunct="1">
+              <a:lnSpc>
+                <a:spcPct val="90000"/>
+              </a:lnSpc>
+              <a:spcBef>
+                <a:spcPts val="500"/>
+              </a:spcBef>
+              <a:buFont typeface="Arial" panose="020B0604020202020204" pitchFamily="34" charset="0"/>
+              <a:buChar char="•"/>
+              <a:defRPr sz="1800" kern="1200">
+                <a:solidFill>
+                  <a:schemeClr val="tx1"/>
+                </a:solidFill>
+                <a:latin typeface="+mn-lt"/>
+                <a:ea typeface="+mn-ea"/>
+                <a:cs typeface="+mn-cs"/>
+              </a:defRPr>
+            </a:lvl8pPr>
+            <a:lvl9pPr marL="3886200" indent="-228600" algn="l" defTabSz="914400" rtl="0" eaLnBrk="1" latinLnBrk="0" hangingPunct="1">
+              <a:lnSpc>
+                <a:spcPct val="90000"/>
+              </a:lnSpc>
+              <a:spcBef>
+                <a:spcPts val="500"/>
+              </a:spcBef>
+              <a:buFont typeface="Arial" panose="020B0604020202020204" pitchFamily="34" charset="0"/>
+              <a:buChar char="•"/>
+              <a:defRPr sz="1800" kern="1200">
+                <a:solidFill>
+                  <a:schemeClr val="tx1"/>
+                </a:solidFill>
+                <a:latin typeface="+mn-lt"/>
+                <a:ea typeface="+mn-ea"/>
+                <a:cs typeface="+mn-cs"/>
+              </a:defRPr>
+            </a:lvl9pPr>
+          </a:lstStyle>
+          <a:p>
+            <a:pPr marL="0" indent="0">
+              <a:buNone/>
+            </a:pPr>
+            <a:r>
+              <a:rPr lang="en-CA" sz="2600" dirty="0" err="1" smtClean="0"/>
+              <a:t>TypeScript</a:t>
+            </a:r>
+            <a:endParaRPr lang="en-CA" sz="2600" dirty="0" smtClean="0"/>
+          </a:p>
+          <a:p>
+            <a:pPr marL="0" indent="0">
+              <a:buNone/>
+            </a:pPr>
+            <a:r>
+              <a:rPr lang="en-CA" sz="2200" dirty="0" smtClean="0"/>
+              <a:t>Microsoft's </a:t>
+            </a:r>
+            <a:r>
+              <a:rPr lang="en-CA" sz="2200" dirty="0" err="1" smtClean="0"/>
+              <a:t>TypeScript</a:t>
+            </a:r>
+            <a:r>
+              <a:rPr lang="en-CA" sz="2200" dirty="0" smtClean="0"/>
+              <a:t> may be the best of the many JavaScript front ends. It seems to generate the most attractive code. And I think it should take pressure off of the </a:t>
+            </a:r>
+            <a:r>
+              <a:rPr lang="en-CA" sz="2200" dirty="0" err="1" smtClean="0"/>
+              <a:t>ECMAScript</a:t>
+            </a:r>
+            <a:r>
+              <a:rPr lang="en-CA" sz="2200" dirty="0" smtClean="0"/>
+              <a:t> Standard for new features like type declarations and classes. Anders has shown that these can be provided nicely by a preprocessor, so there is no need to change the underlying language.</a:t>
+            </a:r>
+            <a:br>
+              <a:rPr lang="en-CA" sz="2200" dirty="0" smtClean="0"/>
+            </a:br>
+            <a:r>
+              <a:rPr lang="en-CA" sz="2200" dirty="0" smtClean="0"/>
+              <a:t/>
+            </a:r>
+            <a:br>
+              <a:rPr lang="en-CA" sz="2200" dirty="0" smtClean="0"/>
+            </a:br>
+            <a:r>
+              <a:rPr lang="en-CA" sz="2200" dirty="0" smtClean="0"/>
+              <a:t>I think that JavaScript's loose typing is one of its best features and that type checking is way overrated. </a:t>
+            </a:r>
+            <a:r>
+              <a:rPr lang="en-CA" sz="2200" dirty="0" err="1" smtClean="0"/>
+              <a:t>TypeScript</a:t>
+            </a:r>
+            <a:r>
+              <a:rPr lang="en-CA" sz="2200" dirty="0" smtClean="0"/>
+              <a:t> adds sweetness, but at a price. It is not a price I am willing to pay.﻿</a:t>
+            </a:r>
+          </a:p>
+          <a:p>
+            <a:endParaRPr lang="en-US" dirty="0" smtClean="0"/>
+          </a:p>
+          <a:p>
+            <a:pPr marL="0" indent="0">
+              <a:buFont typeface="Arial" panose="020B0604020202020204" pitchFamily="34" charset="0"/>
+              <a:buNone/>
+            </a:pPr>
+            <a:endParaRPr lang="en-US" dirty="0"/>
+          </a:p>
+        </p:txBody>
+      </p:sp>
+    </p:spTree>
+    <p:extLst>
+      <p:ext uri="{BB962C8B-B14F-4D97-AF65-F5344CB8AC3E}">
+        <p14:creationId xmlns:p14="http://schemas.microsoft.com/office/powerpoint/2010/main" val="3512428719"/>
+      </p:ext>
+    </p:extLst>
+  </p:cSld>
+  <p:clrMapOvr>
+    <a:masterClrMapping/>
+  </p:clrMapOvr>
+  <p:timing>
+    <p:tnLst>
+      <p:par>
+        <p:cTn id="1" dur="indefinite" restart="never" nodeType="tmRoot"/>
+      </p:par>
+    </p:tnLst>
+  </p:timing>
+</p:sld>
+</file>
+
+<file path=ppt/slides/slide11.xml><?xml version="1.0" encoding="utf-8"?>
+<p:sld xmlns:a="http://schemas.openxmlformats.org/drawingml/2006/main" xmlns:r="http://schemas.openxmlformats.org/officeDocument/2006/relationships" xmlns:p="http://schemas.openxmlformats.org/presentationml/2006/main">
+  <p:cSld>
+    <p:spTree>
+      <p:nvGrpSpPr>
+        <p:cNvPr id="1" name=""/>
+        <p:cNvGrpSpPr/>
+        <p:nvPr/>
+      </p:nvGrpSpPr>
+      <p:grpSpPr>
+        <a:xfrm>
+          <a:off x="0" y="0"/>
+          <a:ext cx="0" cy="0"/>
+          <a:chOff x="0" y="0"/>
+          <a:chExt cx="0" cy="0"/>
+        </a:xfrm>
+      </p:grpSpPr>
+      <p:sp>
+        <p:nvSpPr>
+          <p:cNvPr id="2" name="Title 1"/>
+          <p:cNvSpPr>
+            <a:spLocks noGrp="1"/>
+          </p:cNvSpPr>
+          <p:nvPr>
+            <p:ph type="title"/>
+          </p:nvPr>
+        </p:nvSpPr>
+        <p:spPr>
+          <a:xfrm>
+            <a:off x="838200" y="365126"/>
+            <a:ext cx="10515600" cy="714738"/>
+          </a:xfrm>
+        </p:spPr>
+        <p:txBody>
+          <a:bodyPr/>
+          <a:lstStyle/>
+          <a:p>
+            <a:r>
+              <a:rPr lang="en-US" dirty="0" smtClean="0"/>
+              <a:t>Brendan </a:t>
+            </a:r>
+            <a:r>
+              <a:rPr lang="en-US" dirty="0" err="1" smtClean="0"/>
+              <a:t>Eich</a:t>
+            </a:r>
+            <a:endParaRPr lang="en-US" dirty="0"/>
+          </a:p>
+        </p:txBody>
+      </p:sp>
+      <p:sp>
+        <p:nvSpPr>
+          <p:cNvPr id="3" name="Content Placeholder 2"/>
+          <p:cNvSpPr>
+            <a:spLocks noGrp="1"/>
+          </p:cNvSpPr>
+          <p:nvPr>
+            <p:ph idx="1"/>
+          </p:nvPr>
+        </p:nvSpPr>
+        <p:spPr>
+          <a:xfrm>
+            <a:off x="496389" y="1227909"/>
+            <a:ext cx="5538651" cy="4949054"/>
+          </a:xfrm>
+        </p:spPr>
+        <p:txBody>
+          <a:bodyPr>
+            <a:normAutofit/>
+          </a:bodyPr>
+          <a:lstStyle/>
+          <a:p>
+            <a:pPr marL="0" indent="0">
+              <a:buNone/>
+            </a:pPr>
+            <a:r>
+              <a:rPr lang="en-CA" sz="2600" dirty="0" err="1" smtClean="0"/>
+              <a:t>CoffeeScript</a:t>
+            </a:r>
+            <a:endParaRPr lang="en-CA" sz="2600" dirty="0"/>
+          </a:p>
+          <a:p>
+            <a:pPr marL="0" indent="0">
+              <a:buNone/>
+            </a:pPr>
+            <a:r>
+              <a:rPr lang="en-CA" sz="2200" dirty="0" smtClean="0"/>
+              <a:t>It helps to have thinks like </a:t>
+            </a:r>
+            <a:r>
+              <a:rPr lang="en-CA" sz="2200" dirty="0" err="1" smtClean="0"/>
+              <a:t>CoffeeScript</a:t>
+            </a:r>
+            <a:r>
+              <a:rPr lang="en-CA" sz="2200" dirty="0" smtClean="0"/>
+              <a:t> out there it isn’t overriding, it doesn’t tell us what we must to do, but it’s suggestive, and if we want to pave that cow path we can, and I’m in favor.</a:t>
+            </a:r>
+          </a:p>
+          <a:p>
+            <a:pPr marL="0" indent="0">
+              <a:buNone/>
+            </a:pPr>
+            <a:endParaRPr lang="en-CA" sz="2200" dirty="0"/>
+          </a:p>
+          <a:p>
+            <a:pPr marL="0" indent="0">
+              <a:buNone/>
+            </a:pPr>
+            <a:r>
+              <a:rPr lang="en-CA" sz="2200" dirty="0" smtClean="0"/>
+              <a:t>I advocated strongly for standardising prototypal inheritance à la </a:t>
+            </a:r>
+            <a:r>
+              <a:rPr lang="en-CA" sz="2200" dirty="0" err="1" smtClean="0"/>
+              <a:t>CoffeeScript’s</a:t>
+            </a:r>
+            <a:r>
+              <a:rPr lang="en-CA" sz="2200" dirty="0" smtClean="0"/>
+              <a:t> class, super and @ syntactic sugar.</a:t>
+            </a:r>
+            <a:endParaRPr lang="en-US" sz="2200" dirty="0" smtClean="0"/>
+          </a:p>
+        </p:txBody>
+      </p:sp>
+      <p:sp>
+        <p:nvSpPr>
+          <p:cNvPr id="4" name="Content Placeholder 2"/>
+          <p:cNvSpPr txBox="1">
+            <a:spLocks/>
+          </p:cNvSpPr>
+          <p:nvPr/>
+        </p:nvSpPr>
+        <p:spPr>
+          <a:xfrm>
+            <a:off x="6035040" y="1227909"/>
+            <a:ext cx="5860869" cy="4949054"/>
+          </a:xfrm>
+          <a:prstGeom prst="rect">
+            <a:avLst/>
+          </a:prstGeom>
+        </p:spPr>
+        <p:txBody>
+          <a:bodyPr vert="horz" lIns="91440" tIns="45720" rIns="91440" bIns="45720" rtlCol="0">
+            <a:normAutofit/>
+          </a:bodyPr>
+          <a:lstStyle>
+            <a:lvl1pPr marL="228600" indent="-228600" algn="l" defTabSz="914400" rtl="0" eaLnBrk="1" latinLnBrk="0" hangingPunct="1">
+              <a:lnSpc>
+                <a:spcPct val="90000"/>
+              </a:lnSpc>
+              <a:spcBef>
+                <a:spcPts val="1000"/>
+              </a:spcBef>
+              <a:buFont typeface="Arial" panose="020B0604020202020204" pitchFamily="34" charset="0"/>
+              <a:buChar char="•"/>
+              <a:defRPr sz="2800" kern="1200">
+                <a:solidFill>
+                  <a:schemeClr val="tx1"/>
+                </a:solidFill>
+                <a:latin typeface="+mn-lt"/>
+                <a:ea typeface="+mn-ea"/>
+                <a:cs typeface="+mn-cs"/>
+              </a:defRPr>
+            </a:lvl1pPr>
+            <a:lvl2pPr marL="685800" indent="-228600" algn="l" defTabSz="914400" rtl="0" eaLnBrk="1" latinLnBrk="0" hangingPunct="1">
+              <a:lnSpc>
+                <a:spcPct val="90000"/>
+              </a:lnSpc>
+              <a:spcBef>
+                <a:spcPts val="500"/>
+              </a:spcBef>
+              <a:buFont typeface="Arial" panose="020B0604020202020204" pitchFamily="34" charset="0"/>
+              <a:buChar char="•"/>
+              <a:defRPr sz="2400" kern="1200">
+                <a:solidFill>
+                  <a:schemeClr val="tx1"/>
+                </a:solidFill>
+                <a:latin typeface="+mn-lt"/>
+                <a:ea typeface="+mn-ea"/>
+                <a:cs typeface="+mn-cs"/>
+              </a:defRPr>
+            </a:lvl2pPr>
+            <a:lvl3pPr marL="1143000" indent="-228600" algn="l" defTabSz="914400" rtl="0" eaLnBrk="1" latinLnBrk="0" hangingPunct="1">
+              <a:lnSpc>
+                <a:spcPct val="90000"/>
+              </a:lnSpc>
+              <a:spcBef>
+                <a:spcPts val="500"/>
+              </a:spcBef>
+              <a:buFont typeface="Arial" panose="020B0604020202020204" pitchFamily="34" charset="0"/>
+              <a:buChar char="•"/>
+              <a:defRPr sz="2000" kern="1200">
+                <a:solidFill>
+                  <a:schemeClr val="tx1"/>
+                </a:solidFill>
+                <a:latin typeface="+mn-lt"/>
+                <a:ea typeface="+mn-ea"/>
+                <a:cs typeface="+mn-cs"/>
+              </a:defRPr>
+            </a:lvl3pPr>
+            <a:lvl4pPr marL="1600200" indent="-228600" algn="l" defTabSz="914400" rtl="0" eaLnBrk="1" latinLnBrk="0" hangingPunct="1">
+              <a:lnSpc>
+                <a:spcPct val="90000"/>
+              </a:lnSpc>
+              <a:spcBef>
+                <a:spcPts val="500"/>
+              </a:spcBef>
+              <a:buFont typeface="Arial" panose="020B0604020202020204" pitchFamily="34" charset="0"/>
+              <a:buChar char="•"/>
+              <a:defRPr sz="1800" kern="1200">
+                <a:solidFill>
+                  <a:schemeClr val="tx1"/>
+                </a:solidFill>
+                <a:latin typeface="+mn-lt"/>
+                <a:ea typeface="+mn-ea"/>
+                <a:cs typeface="+mn-cs"/>
+              </a:defRPr>
+            </a:lvl4pPr>
+            <a:lvl5pPr marL="2057400" indent="-228600" algn="l" defTabSz="914400" rtl="0" eaLnBrk="1" latinLnBrk="0" hangingPunct="1">
+              <a:lnSpc>
+                <a:spcPct val="90000"/>
+              </a:lnSpc>
+              <a:spcBef>
+                <a:spcPts val="500"/>
+              </a:spcBef>
+              <a:buFont typeface="Arial" panose="020B0604020202020204" pitchFamily="34" charset="0"/>
+              <a:buChar char="•"/>
+              <a:defRPr sz="1800" kern="1200">
+                <a:solidFill>
+                  <a:schemeClr val="tx1"/>
+                </a:solidFill>
+                <a:latin typeface="+mn-lt"/>
+                <a:ea typeface="+mn-ea"/>
+                <a:cs typeface="+mn-cs"/>
+              </a:defRPr>
+            </a:lvl5pPr>
+            <a:lvl6pPr marL="2514600" indent="-228600" algn="l" defTabSz="914400" rtl="0" eaLnBrk="1" latinLnBrk="0" hangingPunct="1">
+              <a:lnSpc>
+                <a:spcPct val="90000"/>
+              </a:lnSpc>
+              <a:spcBef>
+                <a:spcPts val="500"/>
+              </a:spcBef>
+              <a:buFont typeface="Arial" panose="020B0604020202020204" pitchFamily="34" charset="0"/>
+              <a:buChar char="•"/>
+              <a:defRPr sz="1800" kern="1200">
+                <a:solidFill>
+                  <a:schemeClr val="tx1"/>
+                </a:solidFill>
+                <a:latin typeface="+mn-lt"/>
+                <a:ea typeface="+mn-ea"/>
+                <a:cs typeface="+mn-cs"/>
+              </a:defRPr>
+            </a:lvl6pPr>
+            <a:lvl7pPr marL="2971800" indent="-228600" algn="l" defTabSz="914400" rtl="0" eaLnBrk="1" latinLnBrk="0" hangingPunct="1">
+              <a:lnSpc>
+                <a:spcPct val="90000"/>
+              </a:lnSpc>
+              <a:spcBef>
+                <a:spcPts val="500"/>
+              </a:spcBef>
+              <a:buFont typeface="Arial" panose="020B0604020202020204" pitchFamily="34" charset="0"/>
+              <a:buChar char="•"/>
+              <a:defRPr sz="1800" kern="1200">
+                <a:solidFill>
+                  <a:schemeClr val="tx1"/>
+                </a:solidFill>
+                <a:latin typeface="+mn-lt"/>
+                <a:ea typeface="+mn-ea"/>
+                <a:cs typeface="+mn-cs"/>
+              </a:defRPr>
+            </a:lvl7pPr>
+            <a:lvl8pPr marL="3429000" indent="-228600" algn="l" defTabSz="914400" rtl="0" eaLnBrk="1" latinLnBrk="0" hangingPunct="1">
+              <a:lnSpc>
+                <a:spcPct val="90000"/>
+              </a:lnSpc>
+              <a:spcBef>
+                <a:spcPts val="500"/>
+              </a:spcBef>
+              <a:buFont typeface="Arial" panose="020B0604020202020204" pitchFamily="34" charset="0"/>
+              <a:buChar char="•"/>
+              <a:defRPr sz="1800" kern="1200">
+                <a:solidFill>
+                  <a:schemeClr val="tx1"/>
+                </a:solidFill>
+                <a:latin typeface="+mn-lt"/>
+                <a:ea typeface="+mn-ea"/>
+                <a:cs typeface="+mn-cs"/>
+              </a:defRPr>
+            </a:lvl8pPr>
+            <a:lvl9pPr marL="3886200" indent="-228600" algn="l" defTabSz="914400" rtl="0" eaLnBrk="1" latinLnBrk="0" hangingPunct="1">
+              <a:lnSpc>
+                <a:spcPct val="90000"/>
+              </a:lnSpc>
+              <a:spcBef>
+                <a:spcPts val="500"/>
+              </a:spcBef>
+              <a:buFont typeface="Arial" panose="020B0604020202020204" pitchFamily="34" charset="0"/>
+              <a:buChar char="•"/>
+              <a:defRPr sz="1800" kern="1200">
+                <a:solidFill>
+                  <a:schemeClr val="tx1"/>
+                </a:solidFill>
+                <a:latin typeface="+mn-lt"/>
+                <a:ea typeface="+mn-ea"/>
+                <a:cs typeface="+mn-cs"/>
+              </a:defRPr>
+            </a:lvl9pPr>
+          </a:lstStyle>
+          <a:p>
+            <a:pPr marL="0" indent="0">
+              <a:buNone/>
+            </a:pPr>
+            <a:r>
+              <a:rPr lang="en-CA" sz="2600" dirty="0" err="1" smtClean="0"/>
+              <a:t>TypeScript</a:t>
+            </a:r>
+            <a:endParaRPr lang="en-CA" sz="2600" dirty="0" smtClean="0"/>
+          </a:p>
+          <a:p>
+            <a:pPr marL="0" indent="0">
+              <a:buNone/>
+            </a:pPr>
+            <a:r>
+              <a:rPr lang="en-CA" sz="2200" dirty="0" err="1" smtClean="0"/>
+              <a:t>TypeScript</a:t>
+            </a:r>
+            <a:r>
+              <a:rPr lang="en-CA" sz="2200" dirty="0" smtClean="0"/>
+              <a:t> is quite a good piece of work for Visual Studio users, and smartly aligned with ES6.</a:t>
+            </a:r>
+          </a:p>
+          <a:p>
+            <a:pPr marL="0" indent="0">
+              <a:buNone/>
+            </a:pPr>
+            <a:endParaRPr lang="en-US" dirty="0" smtClean="0"/>
+          </a:p>
+          <a:p>
+            <a:pPr marL="0" indent="0">
+              <a:buFont typeface="Arial" panose="020B0604020202020204" pitchFamily="34" charset="0"/>
+              <a:buNone/>
+            </a:pPr>
+            <a:endParaRPr lang="en-US" dirty="0"/>
+          </a:p>
+        </p:txBody>
+      </p:sp>
+    </p:spTree>
+    <p:extLst>
+      <p:ext uri="{BB962C8B-B14F-4D97-AF65-F5344CB8AC3E}">
+        <p14:creationId xmlns:p14="http://schemas.microsoft.com/office/powerpoint/2010/main" val="653692478"/>
+      </p:ext>
+    </p:extLst>
+  </p:cSld>
+  <p:clrMapOvr>
+    <a:masterClrMapping/>
+  </p:clrMapOvr>
+  <p:timing>
+    <p:tnLst>
+      <p:par>
+        <p:cTn id="1" dur="indefinite" restart="never" nodeType="tmRoot"/>
+      </p:par>
+    </p:tnLst>
+  </p:timing>
+</p:sld>
+</file>
+
+<file path=ppt/slides/slide12.xml><?xml version="1.0" encoding="utf-8"?>
+<p:sld xmlns:a="http://schemas.openxmlformats.org/drawingml/2006/main" xmlns:r="http://schemas.openxmlformats.org/officeDocument/2006/relationships" xmlns:p="http://schemas.openxmlformats.org/presentationml/2006/main">
+  <p:cSld>
+    <p:spTree>
+      <p:nvGrpSpPr>
+        <p:cNvPr id="1" name=""/>
+        <p:cNvGrpSpPr/>
+        <p:nvPr/>
+      </p:nvGrpSpPr>
+      <p:grpSpPr>
+        <a:xfrm>
+          <a:off x="0" y="0"/>
+          <a:ext cx="0" cy="0"/>
+          <a:chOff x="0" y="0"/>
+          <a:chExt cx="0" cy="0"/>
+        </a:xfrm>
+      </p:grpSpPr>
+      <p:sp>
+        <p:nvSpPr>
+          <p:cNvPr id="3" name="Content Placeholder 2"/>
+          <p:cNvSpPr>
+            <a:spLocks noGrp="1"/>
+          </p:cNvSpPr>
+          <p:nvPr>
+            <p:ph idx="1"/>
+          </p:nvPr>
+        </p:nvSpPr>
+        <p:spPr>
+          <a:xfrm>
+            <a:off x="1012371" y="2908663"/>
+            <a:ext cx="10515600" cy="679269"/>
+          </a:xfrm>
+        </p:spPr>
+        <p:txBody>
+          <a:bodyPr>
+            <a:noAutofit/>
+          </a:bodyPr>
+          <a:lstStyle/>
+          <a:p>
+            <a:pPr marL="0" indent="0" algn="ctr">
+              <a:buNone/>
+            </a:pPr>
+            <a:r>
+              <a:rPr lang="en-US" sz="4400" dirty="0" smtClean="0"/>
+              <a:t>Questions ?</a:t>
+            </a:r>
+            <a:endParaRPr lang="en-US" sz="4400" dirty="0"/>
+          </a:p>
+        </p:txBody>
+      </p:sp>
+    </p:spTree>
+    <p:extLst>
+      <p:ext uri="{BB962C8B-B14F-4D97-AF65-F5344CB8AC3E}">
+        <p14:creationId xmlns:p14="http://schemas.microsoft.com/office/powerpoint/2010/main" val="167388196"/>
+      </p:ext>
+    </p:extLst>
+  </p:cSld>
+  <p:clrMapOvr>
+    <a:masterClrMapping/>
+  </p:clrMapOvr>
+</p:sld>
+</file>
+
 <file path=ppt/slides/slide2.xml><?xml version="1.0" encoding="utf-8"?>
 <p:sld xmlns:a="http://schemas.openxmlformats.org/drawingml/2006/main" xmlns:r="http://schemas.openxmlformats.org/officeDocument/2006/relationships" xmlns:p="http://schemas.openxmlformats.org/presentationml/2006/main">
   <p:cSld>
@@ -4037,9 +5266,6 @@
           <a:bodyPr/>
           <a:lstStyle/>
           <a:p>
-            <a:endParaRPr lang="en-US" dirty="0" smtClean="0"/>
-          </a:p>
-          <a:p>
             <a:r>
               <a:rPr lang="en-US" dirty="0" smtClean="0"/>
               <a:t>Simplicity</a:t>
@@ -4070,6 +5296,15 @@
             <a:r>
               <a:rPr lang="en-US" dirty="0" smtClean="0"/>
               <a:t>Correctness</a:t>
+            </a:r>
+          </a:p>
+          <a:p>
+            <a:endParaRPr lang="en-US" dirty="0" smtClean="0"/>
+          </a:p>
+          <a:p>
+            <a:r>
+              <a:rPr lang="en-US" dirty="0" smtClean="0"/>
+              <a:t>Compatibility</a:t>
             </a:r>
           </a:p>
           <a:p>
@@ -4129,7 +5364,7 @@
           <a:p>
             <a:r>
               <a:rPr lang="en-US" dirty="0" smtClean="0"/>
-              <a:t>What coffee aims</a:t>
+              <a:t>What about JavaScript</a:t>
             </a:r>
             <a:endParaRPr lang="en-US" dirty="0"/>
           </a:p>
@@ -4160,7 +5395,7 @@
           <a:p>
             <a:r>
               <a:rPr lang="en-US" dirty="0" smtClean="0"/>
-              <a:t>Simplicity</a:t>
+              <a:t>Amount of code to solve a given problem</a:t>
             </a:r>
           </a:p>
           <a:p>
@@ -4169,7 +5404,7 @@
           <a:p>
             <a:r>
               <a:rPr lang="en-US" dirty="0" smtClean="0"/>
-              <a:t>Compactness</a:t>
+              <a:t>Readability, comprehension and maintainability</a:t>
             </a:r>
           </a:p>
           <a:p>
@@ -4178,7 +5413,7 @@
           <a:p>
             <a:r>
               <a:rPr lang="en-US" dirty="0" smtClean="0"/>
-              <a:t>Rapidity</a:t>
+              <a:t>Some of WAT and side-effects</a:t>
             </a:r>
           </a:p>
           <a:p>
@@ -4187,7 +5422,7 @@
           <a:p>
             <a:r>
               <a:rPr lang="en-US" dirty="0" smtClean="0"/>
-              <a:t>Correctness</a:t>
+              <a:t>High level of misunderstanding of the language</a:t>
             </a:r>
           </a:p>
           <a:p>
@@ -4199,6 +5434,582 @@
     <p:extLst>
       <p:ext uri="{BB962C8B-B14F-4D97-AF65-F5344CB8AC3E}">
         <p14:creationId xmlns:p14="http://schemas.microsoft.com/office/powerpoint/2010/main" val="2188537975"/>
+      </p:ext>
+    </p:extLst>
+  </p:cSld>
+  <p:clrMapOvr>
+    <a:masterClrMapping/>
+  </p:clrMapOvr>
+</p:sld>
+</file>
+
+<file path=ppt/slides/slide5.xml><?xml version="1.0" encoding="utf-8"?>
+<p:sld xmlns:a="http://schemas.openxmlformats.org/drawingml/2006/main" xmlns:r="http://schemas.openxmlformats.org/officeDocument/2006/relationships" xmlns:p="http://schemas.openxmlformats.org/presentationml/2006/main">
+  <p:cSld>
+    <p:spTree>
+      <p:nvGrpSpPr>
+        <p:cNvPr id="1" name=""/>
+        <p:cNvGrpSpPr/>
+        <p:nvPr/>
+      </p:nvGrpSpPr>
+      <p:grpSpPr>
+        <a:xfrm>
+          <a:off x="0" y="0"/>
+          <a:ext cx="0" cy="0"/>
+          <a:chOff x="0" y="0"/>
+          <a:chExt cx="0" cy="0"/>
+        </a:xfrm>
+      </p:grpSpPr>
+      <p:sp>
+        <p:nvSpPr>
+          <p:cNvPr id="2" name="Title 1"/>
+          <p:cNvSpPr>
+            <a:spLocks noGrp="1"/>
+          </p:cNvSpPr>
+          <p:nvPr>
+            <p:ph type="title"/>
+          </p:nvPr>
+        </p:nvSpPr>
+        <p:spPr>
+          <a:xfrm>
+            <a:off x="838200" y="365126"/>
+            <a:ext cx="10515600" cy="714738"/>
+          </a:xfrm>
+        </p:spPr>
+        <p:txBody>
+          <a:bodyPr/>
+          <a:lstStyle/>
+          <a:p>
+            <a:r>
+              <a:rPr lang="en-US" dirty="0" smtClean="0"/>
+              <a:t>Allah speaking …</a:t>
+            </a:r>
+            <a:endParaRPr lang="en-US" dirty="0"/>
+          </a:p>
+        </p:txBody>
+      </p:sp>
+      <p:sp>
+        <p:nvSpPr>
+          <p:cNvPr id="3" name="Content Placeholder 2"/>
+          <p:cNvSpPr>
+            <a:spLocks noGrp="1"/>
+          </p:cNvSpPr>
+          <p:nvPr>
+            <p:ph idx="1"/>
+          </p:nvPr>
+        </p:nvSpPr>
+        <p:spPr>
+          <a:xfrm>
+            <a:off x="838200" y="1227909"/>
+            <a:ext cx="10515600" cy="4949054"/>
+          </a:xfrm>
+        </p:spPr>
+        <p:txBody>
+          <a:bodyPr/>
+          <a:lstStyle/>
+          <a:p>
+            <a:endParaRPr lang="en-US" dirty="0" smtClean="0"/>
+          </a:p>
+          <a:p>
+            <a:pPr marL="0" indent="0">
+              <a:buNone/>
+            </a:pPr>
+            <a:r>
+              <a:rPr lang="en-US" dirty="0" smtClean="0"/>
+              <a:t>JavaScript had to look like Java only less so, be Java’s dumb kid brother or boy-hostage sidekick.</a:t>
+            </a:r>
+          </a:p>
+          <a:p>
+            <a:pPr marL="0" indent="0">
+              <a:buNone/>
+            </a:pPr>
+            <a:endParaRPr lang="en-US" dirty="0"/>
+          </a:p>
+          <a:p>
+            <a:pPr marL="0" indent="0">
+              <a:buNone/>
+            </a:pPr>
+            <a:r>
+              <a:rPr lang="en-US" dirty="0" smtClean="0"/>
+              <a:t>Plus, I had to be done in ten days or something worse than </a:t>
+            </a:r>
+            <a:r>
+              <a:rPr lang="en-US" dirty="0" err="1" smtClean="0"/>
+              <a:t>Javascript</a:t>
+            </a:r>
+            <a:r>
+              <a:rPr lang="en-US" dirty="0" smtClean="0"/>
+              <a:t> would have happened.</a:t>
+            </a:r>
+          </a:p>
+          <a:p>
+            <a:pPr marL="0" indent="0">
+              <a:buNone/>
+            </a:pPr>
+            <a:endParaRPr lang="en-US" dirty="0"/>
+          </a:p>
+          <a:p>
+            <a:pPr marL="0" indent="0">
+              <a:buNone/>
+            </a:pPr>
+            <a:r>
+              <a:rPr lang="en-CA" dirty="0" smtClean="0"/>
+              <a:t>I'll do better in the next life.</a:t>
+            </a:r>
+            <a:endParaRPr lang="en-US" dirty="0" smtClean="0"/>
+          </a:p>
+          <a:p>
+            <a:pPr marL="0" indent="0">
+              <a:buNone/>
+            </a:pPr>
+            <a:endParaRPr lang="en-US" dirty="0"/>
+          </a:p>
+          <a:p>
+            <a:pPr marL="0" indent="0" algn="r">
+              <a:buNone/>
+            </a:pPr>
+            <a:r>
+              <a:rPr lang="en-US" dirty="0" smtClean="0"/>
+              <a:t>Brendan </a:t>
+            </a:r>
+            <a:r>
+              <a:rPr lang="en-US" dirty="0" err="1" smtClean="0"/>
+              <a:t>Eich</a:t>
+            </a:r>
+            <a:r>
+              <a:rPr lang="en-US" dirty="0" smtClean="0"/>
+              <a:t> (creator of JavaScript)</a:t>
+            </a:r>
+            <a:endParaRPr lang="en-US" dirty="0"/>
+          </a:p>
+        </p:txBody>
+      </p:sp>
+    </p:spTree>
+    <p:extLst>
+      <p:ext uri="{BB962C8B-B14F-4D97-AF65-F5344CB8AC3E}">
+        <p14:creationId xmlns:p14="http://schemas.microsoft.com/office/powerpoint/2010/main" val="4049175971"/>
+      </p:ext>
+    </p:extLst>
+  </p:cSld>
+  <p:clrMapOvr>
+    <a:masterClrMapping/>
+  </p:clrMapOvr>
+</p:sld>
+</file>
+
+<file path=ppt/slides/slide6.xml><?xml version="1.0" encoding="utf-8"?>
+<p:sld xmlns:a="http://schemas.openxmlformats.org/drawingml/2006/main" xmlns:r="http://schemas.openxmlformats.org/officeDocument/2006/relationships" xmlns:p="http://schemas.openxmlformats.org/presentationml/2006/main">
+  <p:cSld>
+    <p:spTree>
+      <p:nvGrpSpPr>
+        <p:cNvPr id="1" name=""/>
+        <p:cNvGrpSpPr/>
+        <p:nvPr/>
+      </p:nvGrpSpPr>
+      <p:grpSpPr>
+        <a:xfrm>
+          <a:off x="0" y="0"/>
+          <a:ext cx="0" cy="0"/>
+          <a:chOff x="0" y="0"/>
+          <a:chExt cx="0" cy="0"/>
+        </a:xfrm>
+      </p:grpSpPr>
+      <p:sp>
+        <p:nvSpPr>
+          <p:cNvPr id="2" name="Title 1"/>
+          <p:cNvSpPr>
+            <a:spLocks noGrp="1"/>
+          </p:cNvSpPr>
+          <p:nvPr>
+            <p:ph type="title"/>
+          </p:nvPr>
+        </p:nvSpPr>
+        <p:spPr>
+          <a:xfrm>
+            <a:off x="838200" y="365126"/>
+            <a:ext cx="10515600" cy="714738"/>
+          </a:xfrm>
+        </p:spPr>
+        <p:txBody>
+          <a:bodyPr/>
+          <a:lstStyle/>
+          <a:p>
+            <a:r>
+              <a:rPr lang="en-US" dirty="0" smtClean="0"/>
+              <a:t>Coffee in the real life</a:t>
+            </a:r>
+            <a:endParaRPr lang="en-US" dirty="0"/>
+          </a:p>
+        </p:txBody>
+      </p:sp>
+      <p:sp>
+        <p:nvSpPr>
+          <p:cNvPr id="3" name="Content Placeholder 2"/>
+          <p:cNvSpPr>
+            <a:spLocks noGrp="1"/>
+          </p:cNvSpPr>
+          <p:nvPr>
+            <p:ph idx="1"/>
+          </p:nvPr>
+        </p:nvSpPr>
+        <p:spPr>
+          <a:xfrm>
+            <a:off x="838200" y="1227909"/>
+            <a:ext cx="10515600" cy="4949054"/>
+          </a:xfrm>
+        </p:spPr>
+        <p:txBody>
+          <a:bodyPr/>
+          <a:lstStyle/>
+          <a:p>
+            <a:endParaRPr lang="en-US" dirty="0" smtClean="0"/>
+          </a:p>
+          <a:p>
+            <a:r>
+              <a:rPr lang="en-US" dirty="0" smtClean="0"/>
+              <a:t>Open-source, hosted on </a:t>
+            </a:r>
+            <a:r>
+              <a:rPr lang="en-US" dirty="0" err="1" smtClean="0"/>
+              <a:t>Github</a:t>
+            </a:r>
+            <a:endParaRPr lang="en-US" dirty="0" smtClean="0"/>
+          </a:p>
+          <a:p>
+            <a:endParaRPr lang="en-US" dirty="0" smtClean="0"/>
+          </a:p>
+          <a:p>
+            <a:r>
+              <a:rPr lang="en-US" dirty="0" smtClean="0"/>
+              <a:t>11</a:t>
+            </a:r>
+            <a:r>
+              <a:rPr lang="en-US" baseline="30000" dirty="0" smtClean="0"/>
+              <a:t>th</a:t>
+            </a:r>
+            <a:r>
+              <a:rPr lang="en-US" dirty="0" smtClean="0"/>
+              <a:t> most popular language on </a:t>
+            </a:r>
+            <a:r>
+              <a:rPr lang="en-US" dirty="0" err="1" smtClean="0"/>
+              <a:t>Github</a:t>
+            </a:r>
+            <a:endParaRPr lang="en-US" dirty="0" smtClean="0"/>
+          </a:p>
+          <a:p>
+            <a:endParaRPr lang="en-US" dirty="0" smtClean="0"/>
+          </a:p>
+          <a:p>
+            <a:r>
+              <a:rPr lang="en-US" dirty="0" smtClean="0"/>
+              <a:t>How did Coffee  get its name?</a:t>
+            </a:r>
+          </a:p>
+          <a:p>
+            <a:pPr lvl="1"/>
+            <a:r>
+              <a:rPr lang="en-US" dirty="0" smtClean="0"/>
+              <a:t>Coffee was designed to become “</a:t>
+            </a:r>
+            <a:r>
+              <a:rPr lang="en-US" dirty="0" err="1" smtClean="0"/>
+              <a:t>Unfancy</a:t>
+            </a:r>
+            <a:r>
+              <a:rPr lang="en-US" dirty="0"/>
+              <a:t> </a:t>
+            </a:r>
+            <a:r>
+              <a:rPr lang="en-US" dirty="0" smtClean="0"/>
+              <a:t>JavaScript”. Java is a fancy word for coffee, so </a:t>
+            </a:r>
+            <a:r>
+              <a:rPr lang="en-US" dirty="0" err="1" smtClean="0"/>
+              <a:t>unfancy</a:t>
+            </a:r>
+            <a:r>
+              <a:rPr lang="en-US" dirty="0" smtClean="0"/>
+              <a:t> JavaScript is </a:t>
+            </a:r>
+            <a:r>
+              <a:rPr lang="en-US" dirty="0" err="1" smtClean="0"/>
+              <a:t>CoffeeScript</a:t>
+            </a:r>
+            <a:r>
+              <a:rPr lang="en-US" dirty="0"/>
+              <a:t>.</a:t>
+            </a:r>
+            <a:endParaRPr lang="en-US" dirty="0" smtClean="0"/>
+          </a:p>
+          <a:p>
+            <a:endParaRPr lang="en-US" dirty="0" smtClean="0"/>
+          </a:p>
+          <a:p>
+            <a:pPr marL="0" indent="0">
+              <a:buNone/>
+            </a:pPr>
+            <a:endParaRPr lang="en-US" dirty="0"/>
+          </a:p>
+        </p:txBody>
+      </p:sp>
+    </p:spTree>
+    <p:extLst>
+      <p:ext uri="{BB962C8B-B14F-4D97-AF65-F5344CB8AC3E}">
+        <p14:creationId xmlns:p14="http://schemas.microsoft.com/office/powerpoint/2010/main" val="405746719"/>
+      </p:ext>
+    </p:extLst>
+  </p:cSld>
+  <p:clrMapOvr>
+    <a:masterClrMapping/>
+  </p:clrMapOvr>
+</p:sld>
+</file>
+
+<file path=ppt/slides/slide7.xml><?xml version="1.0" encoding="utf-8"?>
+<p:sld xmlns:a="http://schemas.openxmlformats.org/drawingml/2006/main" xmlns:r="http://schemas.openxmlformats.org/officeDocument/2006/relationships" xmlns:p="http://schemas.openxmlformats.org/presentationml/2006/main">
+  <p:cSld>
+    <p:spTree>
+      <p:nvGrpSpPr>
+        <p:cNvPr id="1" name=""/>
+        <p:cNvGrpSpPr/>
+        <p:nvPr/>
+      </p:nvGrpSpPr>
+      <p:grpSpPr>
+        <a:xfrm>
+          <a:off x="0" y="0"/>
+          <a:ext cx="0" cy="0"/>
+          <a:chOff x="0" y="0"/>
+          <a:chExt cx="0" cy="0"/>
+        </a:xfrm>
+      </p:grpSpPr>
+      <p:sp>
+        <p:nvSpPr>
+          <p:cNvPr id="2" name="Title 1"/>
+          <p:cNvSpPr>
+            <a:spLocks noGrp="1"/>
+          </p:cNvSpPr>
+          <p:nvPr>
+            <p:ph type="title"/>
+          </p:nvPr>
+        </p:nvSpPr>
+        <p:spPr>
+          <a:xfrm>
+            <a:off x="838200" y="365126"/>
+            <a:ext cx="10515600" cy="714738"/>
+          </a:xfrm>
+        </p:spPr>
+        <p:txBody>
+          <a:bodyPr/>
+          <a:lstStyle/>
+          <a:p>
+            <a:r>
+              <a:rPr lang="en-US" dirty="0" smtClean="0"/>
+              <a:t>Typescript as rival?</a:t>
+            </a:r>
+            <a:endParaRPr lang="en-US" dirty="0"/>
+          </a:p>
+        </p:txBody>
+      </p:sp>
+      <p:sp>
+        <p:nvSpPr>
+          <p:cNvPr id="3" name="Content Placeholder 2"/>
+          <p:cNvSpPr>
+            <a:spLocks noGrp="1"/>
+          </p:cNvSpPr>
+          <p:nvPr>
+            <p:ph idx="1"/>
+          </p:nvPr>
+        </p:nvSpPr>
+        <p:spPr>
+          <a:xfrm>
+            <a:off x="838200" y="1227909"/>
+            <a:ext cx="10515600" cy="4949054"/>
+          </a:xfrm>
+        </p:spPr>
+        <p:txBody>
+          <a:bodyPr/>
+          <a:lstStyle/>
+          <a:p>
+            <a:endParaRPr lang="en-US" dirty="0" smtClean="0"/>
+          </a:p>
+          <a:p>
+            <a:r>
+              <a:rPr lang="en-US" dirty="0" smtClean="0"/>
+              <a:t>Created in October 2012, but still in preview</a:t>
+            </a:r>
+          </a:p>
+          <a:p>
+            <a:endParaRPr lang="en-US" dirty="0" smtClean="0"/>
+          </a:p>
+          <a:p>
+            <a:r>
+              <a:rPr lang="en-US" dirty="0" smtClean="0"/>
+              <a:t>Open-source, hosted on </a:t>
+            </a:r>
+            <a:r>
+              <a:rPr lang="en-US" dirty="0" err="1" smtClean="0"/>
+              <a:t>CodePlex</a:t>
+            </a:r>
+            <a:endParaRPr lang="en-US" dirty="0" smtClean="0"/>
+          </a:p>
+          <a:p>
+            <a:endParaRPr lang="en-US" dirty="0"/>
+          </a:p>
+          <a:p>
+            <a:r>
+              <a:rPr lang="en-US" dirty="0" smtClean="0"/>
+              <a:t>Not in the top 90 languages on </a:t>
+            </a:r>
+            <a:r>
+              <a:rPr lang="en-US" dirty="0" err="1" smtClean="0"/>
+              <a:t>Github</a:t>
+            </a:r>
+            <a:endParaRPr lang="en-US" dirty="0" smtClean="0"/>
+          </a:p>
+          <a:p>
+            <a:endParaRPr lang="en-US" dirty="0"/>
+          </a:p>
+          <a:p>
+            <a:r>
+              <a:rPr lang="en-US" dirty="0" err="1" smtClean="0"/>
+              <a:t>Transcompiles</a:t>
+            </a:r>
+            <a:r>
+              <a:rPr lang="en-US" dirty="0" smtClean="0"/>
+              <a:t> to JavaScript  (ES3 and ES6)</a:t>
+            </a:r>
+          </a:p>
+          <a:p>
+            <a:endParaRPr lang="en-US" dirty="0" smtClean="0"/>
+          </a:p>
+          <a:p>
+            <a:endParaRPr lang="en-US" dirty="0" smtClean="0"/>
+          </a:p>
+          <a:p>
+            <a:pPr marL="0" indent="0">
+              <a:buNone/>
+            </a:pPr>
+            <a:endParaRPr lang="en-US" dirty="0"/>
+          </a:p>
+        </p:txBody>
+      </p:sp>
+    </p:spTree>
+    <p:extLst>
+      <p:ext uri="{BB962C8B-B14F-4D97-AF65-F5344CB8AC3E}">
+        <p14:creationId xmlns:p14="http://schemas.microsoft.com/office/powerpoint/2010/main" val="3172609909"/>
+      </p:ext>
+    </p:extLst>
+  </p:cSld>
+  <p:clrMapOvr>
+    <a:masterClrMapping/>
+  </p:clrMapOvr>
+</p:sld>
+</file>
+
+<file path=ppt/slides/slide8.xml><?xml version="1.0" encoding="utf-8"?>
+<p:sld xmlns:a="http://schemas.openxmlformats.org/drawingml/2006/main" xmlns:r="http://schemas.openxmlformats.org/officeDocument/2006/relationships" xmlns:p="http://schemas.openxmlformats.org/presentationml/2006/main">
+  <p:cSld>
+    <p:spTree>
+      <p:nvGrpSpPr>
+        <p:cNvPr id="1" name=""/>
+        <p:cNvGrpSpPr/>
+        <p:nvPr/>
+      </p:nvGrpSpPr>
+      <p:grpSpPr>
+        <a:xfrm>
+          <a:off x="0" y="0"/>
+          <a:ext cx="0" cy="0"/>
+          <a:chOff x="0" y="0"/>
+          <a:chExt cx="0" cy="0"/>
+        </a:xfrm>
+      </p:grpSpPr>
+      <p:pic>
+        <p:nvPicPr>
+          <p:cNvPr id="4" name="Content Placeholder 3"/>
+          <p:cNvPicPr>
+            <a:picLocks noGrp="1" noChangeAspect="1"/>
+          </p:cNvPicPr>
+          <p:nvPr>
+            <p:ph idx="1"/>
+          </p:nvPr>
+        </p:nvPicPr>
+        <p:blipFill>
+          <a:blip r:embed="rId2"/>
+          <a:stretch>
+            <a:fillRect/>
+          </a:stretch>
+        </p:blipFill>
+        <p:spPr>
+          <a:xfrm>
+            <a:off x="2358486" y="443820"/>
+            <a:ext cx="7178936" cy="5689600"/>
+          </a:xfrm>
+          <a:prstGeom prst="rect">
+            <a:avLst/>
+          </a:prstGeom>
+        </p:spPr>
+      </p:pic>
+    </p:spTree>
+    <p:extLst>
+      <p:ext uri="{BB962C8B-B14F-4D97-AF65-F5344CB8AC3E}">
+        <p14:creationId xmlns:p14="http://schemas.microsoft.com/office/powerpoint/2010/main" val="1643599696"/>
+      </p:ext>
+    </p:extLst>
+  </p:cSld>
+  <p:clrMapOvr>
+    <a:masterClrMapping/>
+  </p:clrMapOvr>
+</p:sld>
+</file>
+
+<file path=ppt/slides/slide9.xml><?xml version="1.0" encoding="utf-8"?>
+<p:sld xmlns:a="http://schemas.openxmlformats.org/drawingml/2006/main" xmlns:r="http://schemas.openxmlformats.org/officeDocument/2006/relationships" xmlns:p="http://schemas.openxmlformats.org/presentationml/2006/main">
+  <p:cSld>
+    <p:spTree>
+      <p:nvGrpSpPr>
+        <p:cNvPr id="1" name=""/>
+        <p:cNvGrpSpPr/>
+        <p:nvPr/>
+      </p:nvGrpSpPr>
+      <p:grpSpPr>
+        <a:xfrm>
+          <a:off x="0" y="0"/>
+          <a:ext cx="0" cy="0"/>
+          <a:chOff x="0" y="0"/>
+          <a:chExt cx="0" cy="0"/>
+        </a:xfrm>
+      </p:grpSpPr>
+      <p:pic>
+        <p:nvPicPr>
+          <p:cNvPr id="4" name="Content Placeholder 3"/>
+          <p:cNvPicPr>
+            <a:picLocks noGrp="1" noChangeAspect="1"/>
+          </p:cNvPicPr>
+          <p:nvPr>
+            <p:ph idx="1"/>
+          </p:nvPr>
+        </p:nvPicPr>
+        <p:blipFill>
+          <a:blip r:embed="rId2"/>
+          <a:stretch>
+            <a:fillRect/>
+          </a:stretch>
+        </p:blipFill>
+        <p:spPr>
+          <a:xfrm>
+            <a:off x="1699599" y="1442776"/>
+            <a:ext cx="8792802" cy="3753374"/>
+          </a:xfrm>
+          <a:prstGeom prst="rect">
+            <a:avLst/>
+          </a:prstGeom>
+        </p:spPr>
+      </p:pic>
+    </p:spTree>
+    <p:extLst>
+      <p:ext uri="{BB962C8B-B14F-4D97-AF65-F5344CB8AC3E}">
+        <p14:creationId xmlns:p14="http://schemas.microsoft.com/office/powerpoint/2010/main" val="973175204"/>
       </p:ext>
     </p:extLst>
   </p:cSld>

</xml_diff>